<commit_message>
Updated to Ignite Athletics menu
</commit_message>
<xml_diff>
--- a/Assets/External/IgniteAthletics/IgniteAthleticsMenu.pptx
+++ b/Assets/External/IgniteAthletics/IgniteAthleticsMenu.pptx
@@ -243,7 +243,7 @@
           <a:p>
             <a:fld id="{C4CEA28B-AF5F-40EB-93D1-FD089474CF4C}" type="datetimeFigureOut">
               <a:rPr lang="en-US" smtClean="0"/>
-              <a:t>4/23/2022</a:t>
+              <a:t>6/4/2022</a:t>
             </a:fld>
             <a:endParaRPr lang="en-US"/>
           </a:p>
@@ -413,7 +413,7 @@
           <a:p>
             <a:fld id="{C4CEA28B-AF5F-40EB-93D1-FD089474CF4C}" type="datetimeFigureOut">
               <a:rPr lang="en-US" smtClean="0"/>
-              <a:t>4/23/2022</a:t>
+              <a:t>6/4/2022</a:t>
             </a:fld>
             <a:endParaRPr lang="en-US"/>
           </a:p>
@@ -593,7 +593,7 @@
           <a:p>
             <a:fld id="{C4CEA28B-AF5F-40EB-93D1-FD089474CF4C}" type="datetimeFigureOut">
               <a:rPr lang="en-US" smtClean="0"/>
-              <a:t>4/23/2022</a:t>
+              <a:t>6/4/2022</a:t>
             </a:fld>
             <a:endParaRPr lang="en-US"/>
           </a:p>
@@ -763,7 +763,7 @@
           <a:p>
             <a:fld id="{C4CEA28B-AF5F-40EB-93D1-FD089474CF4C}" type="datetimeFigureOut">
               <a:rPr lang="en-US" smtClean="0"/>
-              <a:t>4/23/2022</a:t>
+              <a:t>6/4/2022</a:t>
             </a:fld>
             <a:endParaRPr lang="en-US"/>
           </a:p>
@@ -1009,7 +1009,7 @@
           <a:p>
             <a:fld id="{C4CEA28B-AF5F-40EB-93D1-FD089474CF4C}" type="datetimeFigureOut">
               <a:rPr lang="en-US" smtClean="0"/>
-              <a:t>4/23/2022</a:t>
+              <a:t>6/4/2022</a:t>
             </a:fld>
             <a:endParaRPr lang="en-US"/>
           </a:p>
@@ -1241,7 +1241,7 @@
           <a:p>
             <a:fld id="{C4CEA28B-AF5F-40EB-93D1-FD089474CF4C}" type="datetimeFigureOut">
               <a:rPr lang="en-US" smtClean="0"/>
-              <a:t>4/23/2022</a:t>
+              <a:t>6/4/2022</a:t>
             </a:fld>
             <a:endParaRPr lang="en-US"/>
           </a:p>
@@ -1608,7 +1608,7 @@
           <a:p>
             <a:fld id="{C4CEA28B-AF5F-40EB-93D1-FD089474CF4C}" type="datetimeFigureOut">
               <a:rPr lang="en-US" smtClean="0"/>
-              <a:t>4/23/2022</a:t>
+              <a:t>6/4/2022</a:t>
             </a:fld>
             <a:endParaRPr lang="en-US"/>
           </a:p>
@@ -1726,7 +1726,7 @@
           <a:p>
             <a:fld id="{C4CEA28B-AF5F-40EB-93D1-FD089474CF4C}" type="datetimeFigureOut">
               <a:rPr lang="en-US" smtClean="0"/>
-              <a:t>4/23/2022</a:t>
+              <a:t>6/4/2022</a:t>
             </a:fld>
             <a:endParaRPr lang="en-US"/>
           </a:p>
@@ -1821,7 +1821,7 @@
           <a:p>
             <a:fld id="{C4CEA28B-AF5F-40EB-93D1-FD089474CF4C}" type="datetimeFigureOut">
               <a:rPr lang="en-US" smtClean="0"/>
-              <a:t>4/23/2022</a:t>
+              <a:t>6/4/2022</a:t>
             </a:fld>
             <a:endParaRPr lang="en-US"/>
           </a:p>
@@ -2098,7 +2098,7 @@
           <a:p>
             <a:fld id="{C4CEA28B-AF5F-40EB-93D1-FD089474CF4C}" type="datetimeFigureOut">
               <a:rPr lang="en-US" smtClean="0"/>
-              <a:t>4/23/2022</a:t>
+              <a:t>6/4/2022</a:t>
             </a:fld>
             <a:endParaRPr lang="en-US"/>
           </a:p>
@@ -2355,7 +2355,7 @@
           <a:p>
             <a:fld id="{C4CEA28B-AF5F-40EB-93D1-FD089474CF4C}" type="datetimeFigureOut">
               <a:rPr lang="en-US" smtClean="0"/>
-              <a:t>4/23/2022</a:t>
+              <a:t>6/4/2022</a:t>
             </a:fld>
             <a:endParaRPr lang="en-US"/>
           </a:p>
@@ -2568,7 +2568,7 @@
           <a:p>
             <a:fld id="{C4CEA28B-AF5F-40EB-93D1-FD089474CF4C}" type="datetimeFigureOut">
               <a:rPr lang="en-US" smtClean="0"/>
-              <a:t>4/23/2022</a:t>
+              <a:t>6/4/2022</a:t>
             </a:fld>
             <a:endParaRPr lang="en-US"/>
           </a:p>
@@ -4735,46 +4735,6 @@
       </p:cxnSp>
       <p:sp>
         <p:nvSpPr>
-          <p:cNvPr id="71" name="TextBox 70">
-            <a:extLst>
-              <a:ext uri="{FF2B5EF4-FFF2-40B4-BE49-F238E27FC236}">
-                <a16:creationId xmlns:a16="http://schemas.microsoft.com/office/drawing/2014/main" id="{7350012B-8544-4ABA-8BB7-9BFB6200DF02}"/>
-              </a:ext>
-            </a:extLst>
-          </p:cNvPr>
-          <p:cNvSpPr txBox="1"/>
-          <p:nvPr/>
-        </p:nvSpPr>
-        <p:spPr>
-          <a:xfrm>
-            <a:off x="12875571" y="5902871"/>
-            <a:ext cx="1342034" cy="404278"/>
-          </a:xfrm>
-          <a:prstGeom prst="rect">
-            <a:avLst/>
-          </a:prstGeom>
-          <a:noFill/>
-        </p:spPr>
-        <p:txBody>
-          <a:bodyPr wrap="none" rtlCol="0">
-            <a:spAutoFit/>
-          </a:bodyPr>
-          <a:lstStyle/>
-          <a:p>
-            <a:r>
-              <a:rPr lang="en-US" sz="2027" dirty="0">
-                <a:solidFill>
-                  <a:schemeClr val="bg1"/>
-                </a:solidFill>
-                <a:latin typeface="Rockwell Extra Bold" panose="02060903040505020403" pitchFamily="18" charset="0"/>
-              </a:rPr>
-              <a:t>Nachos</a:t>
-            </a:r>
-          </a:p>
-        </p:txBody>
-      </p:sp>
-      <p:sp>
-        <p:nvSpPr>
           <p:cNvPr id="72" name="TextBox 71">
             <a:extLst>
               <a:ext uri="{FF2B5EF4-FFF2-40B4-BE49-F238E27FC236}">
@@ -4828,7 +4788,7 @@
         </p:nvSpPr>
         <p:spPr>
           <a:xfrm>
-            <a:off x="12875570" y="6461939"/>
+            <a:off x="12875570" y="6184848"/>
             <a:ext cx="1039067" cy="404278"/>
           </a:xfrm>
           <a:prstGeom prst="rect">
@@ -4868,7 +4828,7 @@
         </p:nvSpPr>
         <p:spPr>
           <a:xfrm>
-            <a:off x="12875570" y="7015937"/>
+            <a:off x="12875570" y="6978993"/>
             <a:ext cx="1455848" cy="404278"/>
           </a:xfrm>
           <a:prstGeom prst="rect">
@@ -4890,46 +4850,6 @@
                 <a:latin typeface="Rockwell Extra Bold" panose="02060903040505020403" pitchFamily="18" charset="0"/>
               </a:rPr>
               <a:t>Pretzels</a:t>
-            </a:r>
-          </a:p>
-        </p:txBody>
-      </p:sp>
-      <p:sp>
-        <p:nvSpPr>
-          <p:cNvPr id="75" name="TextBox 74">
-            <a:extLst>
-              <a:ext uri="{FF2B5EF4-FFF2-40B4-BE49-F238E27FC236}">
-                <a16:creationId xmlns:a16="http://schemas.microsoft.com/office/drawing/2014/main" id="{EDC7DBC2-3A76-44D2-A6D3-13538F9A8396}"/>
-              </a:ext>
-            </a:extLst>
-          </p:cNvPr>
-          <p:cNvSpPr txBox="1"/>
-          <p:nvPr/>
-        </p:nvSpPr>
-        <p:spPr>
-          <a:xfrm>
-            <a:off x="12875572" y="7569935"/>
-            <a:ext cx="1800301" cy="404278"/>
-          </a:xfrm>
-          <a:prstGeom prst="rect">
-            <a:avLst/>
-          </a:prstGeom>
-          <a:noFill/>
-        </p:spPr>
-        <p:txBody>
-          <a:bodyPr wrap="none" rtlCol="0">
-            <a:spAutoFit/>
-          </a:bodyPr>
-          <a:lstStyle/>
-          <a:p>
-            <a:r>
-              <a:rPr lang="en-US" sz="2027" dirty="0">
-                <a:solidFill>
-                  <a:schemeClr val="bg1"/>
-                </a:solidFill>
-                <a:latin typeface="Rockwell Extra Bold" panose="02060903040505020403" pitchFamily="18" charset="0"/>
-              </a:rPr>
-              <a:t>Corn Dogs</a:t>
             </a:r>
           </a:p>
         </p:txBody>
@@ -4948,7 +4868,7 @@
         </p:nvSpPr>
         <p:spPr>
           <a:xfrm>
-            <a:off x="12875570" y="8123933"/>
+            <a:off x="12875570" y="7801329"/>
             <a:ext cx="1522404" cy="404278"/>
           </a:xfrm>
           <a:prstGeom prst="rect">
@@ -4970,46 +4890,6 @@
                 <a:latin typeface="Rockwell Extra Bold" panose="02060903040505020403" pitchFamily="18" charset="0"/>
               </a:rPr>
               <a:t>Popcorn</a:t>
-            </a:r>
-          </a:p>
-        </p:txBody>
-      </p:sp>
-      <p:sp>
-        <p:nvSpPr>
-          <p:cNvPr id="77" name="TextBox 76">
-            <a:extLst>
-              <a:ext uri="{FF2B5EF4-FFF2-40B4-BE49-F238E27FC236}">
-                <a16:creationId xmlns:a16="http://schemas.microsoft.com/office/drawing/2014/main" id="{CC81C154-A9BA-4342-B809-E72205854691}"/>
-              </a:ext>
-            </a:extLst>
-          </p:cNvPr>
-          <p:cNvSpPr txBox="1"/>
-          <p:nvPr/>
-        </p:nvSpPr>
-        <p:spPr>
-          <a:xfrm>
-            <a:off x="17007227" y="5866913"/>
-            <a:ext cx="526106" cy="404278"/>
-          </a:xfrm>
-          <a:prstGeom prst="rect">
-            <a:avLst/>
-          </a:prstGeom>
-          <a:noFill/>
-        </p:spPr>
-        <p:txBody>
-          <a:bodyPr wrap="none" rtlCol="0">
-            <a:spAutoFit/>
-          </a:bodyPr>
-          <a:lstStyle/>
-          <a:p>
-            <a:r>
-              <a:rPr lang="en-US" sz="2027" dirty="0">
-                <a:solidFill>
-                  <a:schemeClr val="bg1"/>
-                </a:solidFill>
-                <a:latin typeface="Rockwell Extra Bold" panose="02060903040505020403" pitchFamily="18" charset="0"/>
-              </a:rPr>
-              <a:t>$3</a:t>
             </a:r>
           </a:p>
         </p:txBody>
@@ -5028,7 +4908,7 @@
         </p:nvSpPr>
         <p:spPr>
           <a:xfrm>
-            <a:off x="17007227" y="6425981"/>
+            <a:off x="17007227" y="6148890"/>
             <a:ext cx="526106" cy="404278"/>
           </a:xfrm>
           <a:prstGeom prst="rect">
@@ -5068,7 +4948,7 @@
         </p:nvSpPr>
         <p:spPr>
           <a:xfrm>
-            <a:off x="17007227" y="6979979"/>
+            <a:off x="17007227" y="6943035"/>
             <a:ext cx="526106" cy="404278"/>
           </a:xfrm>
           <a:prstGeom prst="rect">
@@ -5090,46 +4970,6 @@
                 <a:latin typeface="Rockwell Extra Bold" panose="02060903040505020403" pitchFamily="18" charset="0"/>
               </a:rPr>
               <a:t>$3</a:t>
-            </a:r>
-          </a:p>
-        </p:txBody>
-      </p:sp>
-      <p:sp>
-        <p:nvSpPr>
-          <p:cNvPr id="80" name="TextBox 79">
-            <a:extLst>
-              <a:ext uri="{FF2B5EF4-FFF2-40B4-BE49-F238E27FC236}">
-                <a16:creationId xmlns:a16="http://schemas.microsoft.com/office/drawing/2014/main" id="{B0D61DC8-1186-49AD-B23D-3CFC26C7C3CB}"/>
-              </a:ext>
-            </a:extLst>
-          </p:cNvPr>
-          <p:cNvSpPr txBox="1"/>
-          <p:nvPr/>
-        </p:nvSpPr>
-        <p:spPr>
-          <a:xfrm>
-            <a:off x="17007227" y="7533977"/>
-            <a:ext cx="526106" cy="404278"/>
-          </a:xfrm>
-          <a:prstGeom prst="rect">
-            <a:avLst/>
-          </a:prstGeom>
-          <a:noFill/>
-        </p:spPr>
-        <p:txBody>
-          <a:bodyPr wrap="none" rtlCol="0">
-            <a:spAutoFit/>
-          </a:bodyPr>
-          <a:lstStyle/>
-          <a:p>
-            <a:r>
-              <a:rPr lang="en-US" sz="2027" dirty="0">
-                <a:solidFill>
-                  <a:schemeClr val="bg1"/>
-                </a:solidFill>
-                <a:latin typeface="Rockwell Extra Bold" panose="02060903040505020403" pitchFamily="18" charset="0"/>
-              </a:rPr>
-              <a:t>$2</a:t>
             </a:r>
           </a:p>
         </p:txBody>
@@ -5148,7 +4988,7 @@
         </p:nvSpPr>
         <p:spPr>
           <a:xfrm>
-            <a:off x="17007227" y="8087975"/>
+            <a:off x="17007227" y="7765371"/>
             <a:ext cx="526106" cy="404278"/>
           </a:xfrm>
           <a:prstGeom prst="rect">

</xml_diff>